<commit_message>
Adding new keyboard layout , updating standard template
</commit_message>
<xml_diff>
--- a/software/util/Standard_Templates.pptx
+++ b/software/util/Standard_Templates.pptx
@@ -6,11 +6,13 @@
   </p:sldMasterIdLst>
   <p:sldIdLst>
     <p:sldId id="257" r:id="rId2"/>
-    <p:sldId id="259" r:id="rId3"/>
-    <p:sldId id="261" r:id="rId4"/>
-    <p:sldId id="262" r:id="rId5"/>
-    <p:sldId id="263" r:id="rId6"/>
-    <p:sldId id="264" r:id="rId7"/>
+    <p:sldId id="265" r:id="rId3"/>
+    <p:sldId id="266" r:id="rId4"/>
+    <p:sldId id="259" r:id="rId5"/>
+    <p:sldId id="261" r:id="rId6"/>
+    <p:sldId id="262" r:id="rId7"/>
+    <p:sldId id="263" r:id="rId8"/>
+    <p:sldId id="264" r:id="rId9"/>
   </p:sldIdLst>
   <p:sldSz cx="9144000" cy="6858000" type="screen4x3"/>
   <p:notesSz cx="6858000" cy="9144000"/>
@@ -3155,6 +3157,13 @@
   <p:clrMapOvr>
     <a:masterClrMapping/>
   </p:clrMapOvr>
+  <p:timing>
+    <p:tnLst>
+      <p:par>
+        <p:cTn id="1" dur="indefinite" restart="never" nodeType="tmRoot"/>
+      </p:par>
+    </p:tnLst>
+  </p:timing>
 </p:sld>
 </file>
 
@@ -3187,9 +3196,24 @@
         </p:nvSpPr>
         <p:spPr/>
         <p:txBody>
-          <a:bodyPr/>
-          <a:lstStyle/>
-          <a:p>
+          <a:bodyPr>
+            <a:noAutofit/>
+          </a:bodyPr>
+          <a:lstStyle/>
+          <a:p>
+            <a:pPr algn="l"/>
+            <a:r>
+              <a:rPr lang="en-US" dirty="0" smtClean="0"/>
+              <a:t>Please spare 15-30  min. to do </a:t>
+            </a:r>
+            <a:r>
+              <a:rPr lang="en-US" dirty="0" err="1" smtClean="0"/>
+              <a:t>sewa</a:t>
+            </a:r>
+            <a:r>
+              <a:rPr lang="en-US" dirty="0" smtClean="0"/>
+              <a:t> (volunteer) for</a:t>
+            </a:r>
             <a:endParaRPr lang="en-US" dirty="0"/>
           </a:p>
         </p:txBody>
@@ -3204,64 +3228,80 @@
             <p:ph idx="1"/>
           </p:nvPr>
         </p:nvSpPr>
-        <p:spPr/>
+        <p:spPr>
+          <a:xfrm>
+            <a:off x="457200" y="1874837"/>
+            <a:ext cx="8229600" cy="4525963"/>
+          </a:xfrm>
+        </p:spPr>
         <p:txBody>
           <a:bodyPr>
-            <a:normAutofit/>
+            <a:normAutofit fontScale="92500" lnSpcReduction="10000"/>
           </a:bodyPr>
           <a:lstStyle/>
           <a:p>
-            <a:pPr algn="ctr">
-              <a:buNone/>
+            <a:r>
+              <a:rPr lang="en-US" sz="5400" dirty="0" smtClean="0"/>
+              <a:t>Serving </a:t>
+            </a:r>
+            <a:r>
+              <a:rPr lang="en-US" sz="5400" dirty="0" err="1" smtClean="0"/>
+              <a:t>Langar</a:t>
+            </a:r>
+            <a:endParaRPr lang="en-US" sz="5400" dirty="0" smtClean="0"/>
+          </a:p>
+          <a:p>
+            <a:r>
+              <a:rPr lang="en-US" sz="5400" dirty="0" smtClean="0"/>
+              <a:t>Cleaning </a:t>
+            </a:r>
+          </a:p>
+          <a:p>
+            <a:pPr lvl="3">
+              <a:buFont typeface="Wingdings" pitchFamily="2" charset="2"/>
+              <a:buChar char="v"/>
             </a:pPr>
             <a:r>
-              <a:rPr lang="en-US" sz="5400" dirty="0" err="1" smtClean="0"/>
-              <a:t>Ardaas</a:t>
-            </a:r>
-            <a:r>
-              <a:rPr lang="en-US" sz="5400" dirty="0" smtClean="0"/>
-              <a:t> in progress.</a:t>
-            </a:r>
-          </a:p>
-          <a:p>
-            <a:pPr algn="ctr">
-              <a:buNone/>
+              <a:rPr lang="en-US" sz="4200" dirty="0" smtClean="0"/>
+              <a:t>  Kitchen</a:t>
+            </a:r>
+          </a:p>
+          <a:p>
+            <a:pPr lvl="3">
+              <a:buFont typeface="Wingdings" pitchFamily="2" charset="2"/>
+              <a:buChar char="v"/>
             </a:pPr>
             <a:r>
-              <a:rPr lang="en-US" sz="5400" dirty="0" smtClean="0"/>
-              <a:t>Kindly stand and listen</a:t>
-            </a:r>
-          </a:p>
-          <a:p>
-            <a:pPr algn="ctr">
-              <a:buNone/>
+              <a:rPr lang="en-US" sz="4200" dirty="0" smtClean="0"/>
+              <a:t>  Utensils</a:t>
+            </a:r>
+          </a:p>
+          <a:p>
+            <a:pPr lvl="3">
+              <a:buFont typeface="Wingdings" pitchFamily="2" charset="2"/>
+              <a:buChar char="v"/>
             </a:pPr>
             <a:r>
-              <a:rPr lang="en-US" sz="5400" dirty="0" smtClean="0"/>
-              <a:t>Please don’t speak </a:t>
-            </a:r>
-          </a:p>
-          <a:p>
-            <a:pPr algn="ctr">
-              <a:buNone/>
+              <a:rPr lang="en-US" sz="4200" dirty="0" smtClean="0"/>
+              <a:t>  M</a:t>
+            </a:r>
+            <a:r>
+              <a:rPr lang="en-US" sz="4600" dirty="0" smtClean="0"/>
+              <a:t>ats</a:t>
+            </a:r>
+          </a:p>
+          <a:p>
+            <a:pPr lvl="3">
+              <a:buFont typeface="Wingdings" pitchFamily="2" charset="2"/>
+              <a:buChar char="v"/>
             </a:pPr>
-            <a:endParaRPr lang="en-US" sz="5400" dirty="0" smtClean="0"/>
-          </a:p>
-          <a:p>
-            <a:pPr algn="r">
-              <a:buNone/>
-            </a:pPr>
-            <a:r>
-              <a:rPr lang="en-US" sz="2800" dirty="0" err="1" smtClean="0"/>
-              <a:t>Ardaas</a:t>
-            </a:r>
-            <a:r>
-              <a:rPr lang="en-US" sz="2800" dirty="0" smtClean="0"/>
-              <a:t>  means Prayer</a:t>
-            </a:r>
-          </a:p>
-          <a:p>
-            <a:pPr algn="ctr">
+            <a:r>
+              <a:rPr lang="en-US" sz="4600" dirty="0" smtClean="0"/>
+              <a:t>  Floor</a:t>
+            </a:r>
+          </a:p>
+          <a:p>
+            <a:pPr>
               <a:buNone/>
             </a:pPr>
             <a:endParaRPr lang="en-US" sz="5400" dirty="0" smtClean="0"/>
@@ -3273,6 +3313,13 @@
   <p:clrMapOvr>
     <a:masterClrMapping/>
   </p:clrMapOvr>
+  <p:timing>
+    <p:tnLst>
+      <p:par>
+        <p:cTn id="1" dur="indefinite" restart="never" nodeType="tmRoot"/>
+      </p:par>
+    </p:tnLst>
+  </p:timing>
 </p:sld>
 </file>
 
@@ -3305,73 +3352,89 @@
         </p:nvSpPr>
         <p:spPr/>
         <p:txBody>
-          <a:bodyPr/>
-          <a:lstStyle/>
-          <a:p>
-            <a:endParaRPr lang="en-US" dirty="0"/>
-          </a:p>
-        </p:txBody>
-      </p:sp>
-      <p:sp>
-        <p:nvSpPr>
-          <p:cNvPr id="3" name="Content Placeholder 2"/>
-          <p:cNvSpPr>
-            <a:spLocks noGrp="1"/>
-          </p:cNvSpPr>
-          <p:nvPr>
-            <p:ph idx="1"/>
-          </p:nvPr>
-        </p:nvSpPr>
-        <p:spPr/>
-        <p:txBody>
           <a:bodyPr>
             <a:normAutofit/>
           </a:bodyPr>
           <a:lstStyle/>
           <a:p>
-            <a:pPr algn="ctr">
-              <a:buNone/>
+            <a:r>
+              <a:rPr lang="en-US" dirty="0" smtClean="0"/>
+              <a:t>Library volunteers needed </a:t>
+            </a:r>
+            <a:r>
+              <a:rPr lang="en-US" dirty="0" smtClean="0"/>
+              <a:t>for</a:t>
+            </a:r>
+            <a:endParaRPr lang="en-US" dirty="0"/>
+          </a:p>
+        </p:txBody>
+      </p:sp>
+      <p:sp>
+        <p:nvSpPr>
+          <p:cNvPr id="3" name="Content Placeholder 2"/>
+          <p:cNvSpPr>
+            <a:spLocks noGrp="1"/>
+          </p:cNvSpPr>
+          <p:nvPr>
+            <p:ph idx="1"/>
+          </p:nvPr>
+        </p:nvSpPr>
+        <p:spPr/>
+        <p:txBody>
+          <a:bodyPr>
+            <a:normAutofit/>
+          </a:bodyPr>
+          <a:lstStyle/>
+          <a:p>
+            <a:pPr lvl="1">
+              <a:buFont typeface="Wingdings" pitchFamily="2" charset="2"/>
+              <a:buChar char="v"/>
             </a:pPr>
             <a:r>
-              <a:rPr lang="en-US" sz="5400" dirty="0" smtClean="0"/>
-              <a:t>Headlights of Car number </a:t>
-            </a:r>
-          </a:p>
-          <a:p>
-            <a:pPr algn="ctr">
-              <a:buNone/>
+              <a:rPr lang="en-US" sz="3600" dirty="0" smtClean="0"/>
+              <a:t>  Book issuing</a:t>
+            </a:r>
+          </a:p>
+          <a:p>
+            <a:pPr lvl="1">
+              <a:buFont typeface="Wingdings" pitchFamily="2" charset="2"/>
+              <a:buChar char="v"/>
             </a:pPr>
-            <a:endParaRPr lang="en-US" sz="5400" dirty="0" smtClean="0"/>
-          </a:p>
-          <a:p>
-            <a:pPr algn="ctr">
-              <a:buNone/>
-            </a:pPr>
-            <a:r>
-              <a:rPr lang="en-US" sz="5400" dirty="0" smtClean="0"/>
-              <a:t>are ON</a:t>
-            </a:r>
-          </a:p>
-          <a:p>
-            <a:pPr algn="ctr">
-              <a:buNone/>
-            </a:pPr>
-            <a:r>
-              <a:rPr lang="en-US" sz="5400" dirty="0" smtClean="0"/>
-              <a:t>Please turn them OFF</a:t>
-            </a:r>
-          </a:p>
-          <a:p>
-            <a:pPr algn="ctr">
-              <a:buNone/>
-            </a:pPr>
-            <a:endParaRPr lang="en-US" sz="5400" dirty="0" smtClean="0"/>
-          </a:p>
-          <a:p>
-            <a:pPr algn="ctr">
-              <a:buNone/>
-            </a:pPr>
-            <a:endParaRPr lang="en-US" sz="5400" dirty="0" smtClean="0"/>
+            <a:r>
+              <a:rPr lang="en-US" sz="3600" dirty="0" smtClean="0"/>
+              <a:t>  Registering new members </a:t>
+            </a:r>
+          </a:p>
+          <a:p>
+            <a:endParaRPr lang="en-US" dirty="0" smtClean="0"/>
+          </a:p>
+          <a:p>
+            <a:r>
+              <a:rPr lang="en-US" dirty="0" smtClean="0"/>
+              <a:t>Opening hours</a:t>
+            </a:r>
+          </a:p>
+          <a:p>
+            <a:pPr lvl="2"/>
+            <a:r>
+              <a:rPr lang="en-US" sz="3200" dirty="0" smtClean="0"/>
+              <a:t>Saturday   6 PM – 8 PM</a:t>
+            </a:r>
+          </a:p>
+          <a:p>
+            <a:pPr lvl="2"/>
+            <a:r>
+              <a:rPr lang="en-US" sz="3200" dirty="0" smtClean="0"/>
+              <a:t>Sunday    ,  10  AM – 1 PM</a:t>
+            </a:r>
+          </a:p>
+          <a:p>
+            <a:pPr lvl="2"/>
+            <a:r>
+              <a:rPr lang="en-US" sz="3200" dirty="0" smtClean="0"/>
+              <a:t>Weekdays  , Evening  6 – 7 PM</a:t>
+            </a:r>
+            <a:endParaRPr lang="en-US" sz="3200" dirty="0"/>
           </a:p>
         </p:txBody>
       </p:sp>
@@ -3380,6 +3443,13 @@
   <p:clrMapOvr>
     <a:masterClrMapping/>
   </p:clrMapOvr>
+  <p:timing>
+    <p:tnLst>
+      <p:par>
+        <p:cTn id="1" dur="indefinite" restart="never" nodeType="tmRoot"/>
+      </p:par>
+    </p:tnLst>
+  </p:timing>
 </p:sld>
 </file>
 
@@ -3415,7 +3485,7 @@
           <a:bodyPr/>
           <a:lstStyle/>
           <a:p>
-            <a:endParaRPr lang="en-US"/>
+            <a:endParaRPr lang="en-US" dirty="0"/>
           </a:p>
         </p:txBody>
       </p:sp>
@@ -3440,8 +3510,30 @@
               <a:buNone/>
             </a:pPr>
             <a:r>
+              <a:rPr lang="en-US" sz="5400" dirty="0" err="1" smtClean="0"/>
+              <a:t>Ardaas</a:t>
+            </a:r>
+            <a:r>
               <a:rPr lang="en-US" sz="5400" dirty="0" smtClean="0"/>
-              <a:t>Child named </a:t>
+              <a:t> in progress.</a:t>
+            </a:r>
+          </a:p>
+          <a:p>
+            <a:pPr algn="ctr">
+              <a:buNone/>
+            </a:pPr>
+            <a:r>
+              <a:rPr lang="en-US" sz="5400" dirty="0" smtClean="0"/>
+              <a:t>Kindly stand and listen</a:t>
+            </a:r>
+          </a:p>
+          <a:p>
+            <a:pPr algn="ctr">
+              <a:buNone/>
+            </a:pPr>
+            <a:r>
+              <a:rPr lang="en-US" sz="5400" dirty="0" smtClean="0"/>
+              <a:t>Please don’t speak </a:t>
             </a:r>
           </a:p>
           <a:p>
@@ -3451,14 +3543,23 @@
             <a:endParaRPr lang="en-US" sz="5400" dirty="0" smtClean="0"/>
           </a:p>
           <a:p>
+            <a:pPr algn="r">
+              <a:buNone/>
+            </a:pPr>
+            <a:r>
+              <a:rPr lang="en-US" sz="2800" dirty="0" err="1" smtClean="0"/>
+              <a:t>Ardaas</a:t>
+            </a:r>
+            <a:r>
+              <a:rPr lang="en-US" sz="2800" dirty="0" smtClean="0"/>
+              <a:t>  means Prayer</a:t>
+            </a:r>
+          </a:p>
+          <a:p>
             <a:pPr algn="ctr">
               <a:buNone/>
             </a:pPr>
-            <a:r>
-              <a:rPr lang="en-US" sz="5400" dirty="0" smtClean="0"/>
-              <a:t>has separated from Parents. Please come near stage</a:t>
-            </a:r>
-            <a:endParaRPr lang="en-US" sz="5400" dirty="0"/>
+            <a:endParaRPr lang="en-US" sz="5400" dirty="0" smtClean="0"/>
           </a:p>
         </p:txBody>
       </p:sp>
@@ -3467,6 +3568,13 @@
   <p:clrMapOvr>
     <a:masterClrMapping/>
   </p:clrMapOvr>
+  <p:timing>
+    <p:tnLst>
+      <p:par>
+        <p:cTn id="1" dur="indefinite" restart="never" nodeType="tmRoot"/>
+      </p:par>
+    </p:tnLst>
+  </p:timing>
 </p:sld>
 </file>
 
@@ -3502,7 +3610,7 @@
           <a:bodyPr/>
           <a:lstStyle/>
           <a:p>
-            <a:endParaRPr lang="en-US"/>
+            <a:endParaRPr lang="en-US" dirty="0"/>
           </a:p>
         </p:txBody>
       </p:sp>
@@ -3528,9 +3636,8 @@
             </a:pPr>
             <a:r>
               <a:rPr lang="en-US" sz="5400" dirty="0" smtClean="0"/>
-              <a:t>Mobile &lt;&gt;</a:t>
-            </a:r>
-            <a:endParaRPr lang="en-US" sz="5400" dirty="0" smtClean="0"/>
+              <a:t>Headlights of Car number </a:t>
+            </a:r>
           </a:p>
           <a:p>
             <a:pPr algn="ctr">
@@ -3544,26 +3651,29 @@
             </a:pPr>
             <a:r>
               <a:rPr lang="en-US" sz="5400" dirty="0" smtClean="0"/>
-              <a:t>has </a:t>
-            </a:r>
+              <a:t>are ON</a:t>
+            </a:r>
+          </a:p>
+          <a:p>
+            <a:pPr algn="ctr">
+              <a:buNone/>
+            </a:pPr>
             <a:r>
               <a:rPr lang="en-US" sz="5400" dirty="0" smtClean="0"/>
-              <a:t>been found/lost</a:t>
+              <a:t>Please turn them OFF</a:t>
             </a:r>
           </a:p>
           <a:p>
             <a:pPr algn="ctr">
               <a:buNone/>
             </a:pPr>
-            <a:r>
-              <a:rPr lang="en-US" sz="5400" dirty="0" smtClean="0"/>
-              <a:t>Please </a:t>
-            </a:r>
-            <a:r>
-              <a:rPr lang="en-US" sz="5400" dirty="0" smtClean="0"/>
-              <a:t>come near stage</a:t>
-            </a:r>
-            <a:endParaRPr lang="en-US" sz="5400" dirty="0"/>
+            <a:endParaRPr lang="en-US" sz="5400" dirty="0" smtClean="0"/>
+          </a:p>
+          <a:p>
+            <a:pPr algn="ctr">
+              <a:buNone/>
+            </a:pPr>
+            <a:endParaRPr lang="en-US" sz="5400" dirty="0" smtClean="0"/>
           </a:p>
         </p:txBody>
       </p:sp>
@@ -3572,6 +3682,13 @@
   <p:clrMapOvr>
     <a:masterClrMapping/>
   </p:clrMapOvr>
+  <p:timing>
+    <p:tnLst>
+      <p:par>
+        <p:cTn id="1" dur="indefinite" restart="never" nodeType="tmRoot"/>
+      </p:par>
+    </p:tnLst>
+  </p:timing>
 </p:sld>
 </file>
 
@@ -3633,9 +3750,8 @@
             </a:pPr>
             <a:r>
               <a:rPr lang="en-US" sz="5400" dirty="0" smtClean="0"/>
-              <a:t>Keys&lt;&gt;</a:t>
-            </a:r>
-            <a:endParaRPr lang="en-US" sz="5400" dirty="0" smtClean="0"/>
+              <a:t>Child named </a:t>
+            </a:r>
           </a:p>
           <a:p>
             <a:pPr algn="ctr">
@@ -3649,24 +3765,7 @@
             </a:pPr>
             <a:r>
               <a:rPr lang="en-US" sz="5400" dirty="0" smtClean="0"/>
-              <a:t>has </a:t>
-            </a:r>
-            <a:r>
-              <a:rPr lang="en-US" sz="5400" dirty="0" smtClean="0"/>
-              <a:t>been found/lost</a:t>
-            </a:r>
-          </a:p>
-          <a:p>
-            <a:pPr algn="ctr">
-              <a:buNone/>
-            </a:pPr>
-            <a:r>
-              <a:rPr lang="en-US" sz="5400" dirty="0" smtClean="0"/>
-              <a:t>Please </a:t>
-            </a:r>
-            <a:r>
-              <a:rPr lang="en-US" sz="5400" dirty="0" smtClean="0"/>
-              <a:t>come near stage</a:t>
+              <a:t>has separated from Parents. Please come near stage</a:t>
             </a:r>
             <a:endParaRPr lang="en-US" sz="5400" dirty="0"/>
           </a:p>
@@ -3677,6 +3776,219 @@
   <p:clrMapOvr>
     <a:masterClrMapping/>
   </p:clrMapOvr>
+  <p:timing>
+    <p:tnLst>
+      <p:par>
+        <p:cTn id="1" dur="indefinite" restart="never" nodeType="tmRoot"/>
+      </p:par>
+    </p:tnLst>
+  </p:timing>
+</p:sld>
+</file>
+
+<file path=ppt/slides/slide7.xml><?xml version="1.0" encoding="utf-8"?>
+<p:sld xmlns:a="http://schemas.openxmlformats.org/drawingml/2006/main" xmlns:r="http://schemas.openxmlformats.org/officeDocument/2006/relationships" xmlns:p="http://schemas.openxmlformats.org/presentationml/2006/main">
+  <p:cSld>
+    <p:spTree>
+      <p:nvGrpSpPr>
+        <p:cNvPr id="1" name=""/>
+        <p:cNvGrpSpPr/>
+        <p:nvPr/>
+      </p:nvGrpSpPr>
+      <p:grpSpPr>
+        <a:xfrm>
+          <a:off x="0" y="0"/>
+          <a:ext cx="0" cy="0"/>
+          <a:chOff x="0" y="0"/>
+          <a:chExt cx="0" cy="0"/>
+        </a:xfrm>
+      </p:grpSpPr>
+      <p:sp>
+        <p:nvSpPr>
+          <p:cNvPr id="2" name="Title 1"/>
+          <p:cNvSpPr>
+            <a:spLocks noGrp="1"/>
+          </p:cNvSpPr>
+          <p:nvPr>
+            <p:ph type="title"/>
+          </p:nvPr>
+        </p:nvSpPr>
+        <p:spPr/>
+        <p:txBody>
+          <a:bodyPr/>
+          <a:lstStyle/>
+          <a:p>
+            <a:endParaRPr lang="en-US"/>
+          </a:p>
+        </p:txBody>
+      </p:sp>
+      <p:sp>
+        <p:nvSpPr>
+          <p:cNvPr id="3" name="Content Placeholder 2"/>
+          <p:cNvSpPr>
+            <a:spLocks noGrp="1"/>
+          </p:cNvSpPr>
+          <p:nvPr>
+            <p:ph idx="1"/>
+          </p:nvPr>
+        </p:nvSpPr>
+        <p:spPr/>
+        <p:txBody>
+          <a:bodyPr>
+            <a:normAutofit/>
+          </a:bodyPr>
+          <a:lstStyle/>
+          <a:p>
+            <a:pPr algn="ctr">
+              <a:buNone/>
+            </a:pPr>
+            <a:r>
+              <a:rPr lang="en-US" sz="5400" dirty="0" smtClean="0"/>
+              <a:t>Mobile &lt;&gt;</a:t>
+            </a:r>
+          </a:p>
+          <a:p>
+            <a:pPr algn="ctr">
+              <a:buNone/>
+            </a:pPr>
+            <a:endParaRPr lang="en-US" sz="5400" dirty="0" smtClean="0"/>
+          </a:p>
+          <a:p>
+            <a:pPr algn="ctr">
+              <a:buNone/>
+            </a:pPr>
+            <a:r>
+              <a:rPr lang="en-US" sz="5400" dirty="0" smtClean="0"/>
+              <a:t>has been found/lost</a:t>
+            </a:r>
+          </a:p>
+          <a:p>
+            <a:pPr algn="ctr">
+              <a:buNone/>
+            </a:pPr>
+            <a:r>
+              <a:rPr lang="en-US" sz="5400" dirty="0" smtClean="0"/>
+              <a:t>Please come near stage</a:t>
+            </a:r>
+            <a:endParaRPr lang="en-US" sz="5400" dirty="0"/>
+          </a:p>
+        </p:txBody>
+      </p:sp>
+    </p:spTree>
+  </p:cSld>
+  <p:clrMapOvr>
+    <a:masterClrMapping/>
+  </p:clrMapOvr>
+  <p:timing>
+    <p:tnLst>
+      <p:par>
+        <p:cTn id="1" dur="indefinite" restart="never" nodeType="tmRoot"/>
+      </p:par>
+    </p:tnLst>
+  </p:timing>
+</p:sld>
+</file>
+
+<file path=ppt/slides/slide8.xml><?xml version="1.0" encoding="utf-8"?>
+<p:sld xmlns:a="http://schemas.openxmlformats.org/drawingml/2006/main" xmlns:r="http://schemas.openxmlformats.org/officeDocument/2006/relationships" xmlns:p="http://schemas.openxmlformats.org/presentationml/2006/main">
+  <p:cSld>
+    <p:spTree>
+      <p:nvGrpSpPr>
+        <p:cNvPr id="1" name=""/>
+        <p:cNvGrpSpPr/>
+        <p:nvPr/>
+      </p:nvGrpSpPr>
+      <p:grpSpPr>
+        <a:xfrm>
+          <a:off x="0" y="0"/>
+          <a:ext cx="0" cy="0"/>
+          <a:chOff x="0" y="0"/>
+          <a:chExt cx="0" cy="0"/>
+        </a:xfrm>
+      </p:grpSpPr>
+      <p:sp>
+        <p:nvSpPr>
+          <p:cNvPr id="2" name="Title 1"/>
+          <p:cNvSpPr>
+            <a:spLocks noGrp="1"/>
+          </p:cNvSpPr>
+          <p:nvPr>
+            <p:ph type="title"/>
+          </p:nvPr>
+        </p:nvSpPr>
+        <p:spPr/>
+        <p:txBody>
+          <a:bodyPr/>
+          <a:lstStyle/>
+          <a:p>
+            <a:endParaRPr lang="en-US"/>
+          </a:p>
+        </p:txBody>
+      </p:sp>
+      <p:sp>
+        <p:nvSpPr>
+          <p:cNvPr id="3" name="Content Placeholder 2"/>
+          <p:cNvSpPr>
+            <a:spLocks noGrp="1"/>
+          </p:cNvSpPr>
+          <p:nvPr>
+            <p:ph idx="1"/>
+          </p:nvPr>
+        </p:nvSpPr>
+        <p:spPr/>
+        <p:txBody>
+          <a:bodyPr>
+            <a:normAutofit/>
+          </a:bodyPr>
+          <a:lstStyle/>
+          <a:p>
+            <a:pPr algn="ctr">
+              <a:buNone/>
+            </a:pPr>
+            <a:r>
+              <a:rPr lang="en-US" sz="5400" dirty="0" smtClean="0"/>
+              <a:t>Keys&lt;&gt;</a:t>
+            </a:r>
+          </a:p>
+          <a:p>
+            <a:pPr algn="ctr">
+              <a:buNone/>
+            </a:pPr>
+            <a:endParaRPr lang="en-US" sz="5400" dirty="0" smtClean="0"/>
+          </a:p>
+          <a:p>
+            <a:pPr algn="ctr">
+              <a:buNone/>
+            </a:pPr>
+            <a:r>
+              <a:rPr lang="en-US" sz="5400" dirty="0" smtClean="0"/>
+              <a:t>has been found/lost</a:t>
+            </a:r>
+          </a:p>
+          <a:p>
+            <a:pPr algn="ctr">
+              <a:buNone/>
+            </a:pPr>
+            <a:r>
+              <a:rPr lang="en-US" sz="5400" dirty="0" smtClean="0"/>
+              <a:t>Please come near stage</a:t>
+            </a:r>
+            <a:endParaRPr lang="en-US" sz="5400" dirty="0"/>
+          </a:p>
+        </p:txBody>
+      </p:sp>
+    </p:spTree>
+  </p:cSld>
+  <p:clrMapOvr>
+    <a:masterClrMapping/>
+  </p:clrMapOvr>
+  <p:timing>
+    <p:tnLst>
+      <p:par>
+        <p:cTn id="1" dur="indefinite" restart="never" nodeType="tmRoot"/>
+      </p:par>
+    </p:tnLst>
+  </p:timing>
 </p:sld>
 </file>
 

</xml_diff>

<commit_message>
Adding cleaning in progress slide
</commit_message>
<xml_diff>
--- a/software/util/Standard_Templates.pptx
+++ b/software/util/Standard_Templates.pptx
@@ -13,6 +13,7 @@
     <p:sldId id="262" r:id="rId7"/>
     <p:sldId id="263" r:id="rId8"/>
     <p:sldId id="264" r:id="rId9"/>
+    <p:sldId id="267" r:id="rId10"/>
   </p:sldIdLst>
   <p:sldSz cx="9144000" cy="6858000" type="screen4x3"/>
   <p:notesSz cx="6858000" cy="9144000"/>
@@ -296,7 +297,7 @@
             <a:fld id="{904268BC-9134-45EB-BFAD-ECF69EE760CB}" type="datetimeFigureOut">
               <a:rPr lang="en-US" smtClean="0"/>
               <a:pPr/>
-              <a:t>6/8/2014</a:t>
+              <a:t>6/9/2014</a:t>
             </a:fld>
             <a:endParaRPr lang="en-US"/>
           </a:p>
@@ -463,7 +464,7 @@
             <a:fld id="{904268BC-9134-45EB-BFAD-ECF69EE760CB}" type="datetimeFigureOut">
               <a:rPr lang="en-US" smtClean="0"/>
               <a:pPr/>
-              <a:t>6/8/2014</a:t>
+              <a:t>6/9/2014</a:t>
             </a:fld>
             <a:endParaRPr lang="en-US"/>
           </a:p>
@@ -640,7 +641,7 @@
             <a:fld id="{904268BC-9134-45EB-BFAD-ECF69EE760CB}" type="datetimeFigureOut">
               <a:rPr lang="en-US" smtClean="0"/>
               <a:pPr/>
-              <a:t>6/8/2014</a:t>
+              <a:t>6/9/2014</a:t>
             </a:fld>
             <a:endParaRPr lang="en-US"/>
           </a:p>
@@ -807,7 +808,7 @@
             <a:fld id="{904268BC-9134-45EB-BFAD-ECF69EE760CB}" type="datetimeFigureOut">
               <a:rPr lang="en-US" smtClean="0"/>
               <a:pPr/>
-              <a:t>6/8/2014</a:t>
+              <a:t>6/9/2014</a:t>
             </a:fld>
             <a:endParaRPr lang="en-US"/>
           </a:p>
@@ -1050,7 +1051,7 @@
             <a:fld id="{904268BC-9134-45EB-BFAD-ECF69EE760CB}" type="datetimeFigureOut">
               <a:rPr lang="en-US" smtClean="0"/>
               <a:pPr/>
-              <a:t>6/8/2014</a:t>
+              <a:t>6/9/2014</a:t>
             </a:fld>
             <a:endParaRPr lang="en-US"/>
           </a:p>
@@ -1335,7 +1336,7 @@
             <a:fld id="{904268BC-9134-45EB-BFAD-ECF69EE760CB}" type="datetimeFigureOut">
               <a:rPr lang="en-US" smtClean="0"/>
               <a:pPr/>
-              <a:t>6/8/2014</a:t>
+              <a:t>6/9/2014</a:t>
             </a:fld>
             <a:endParaRPr lang="en-US"/>
           </a:p>
@@ -1754,7 +1755,7 @@
             <a:fld id="{904268BC-9134-45EB-BFAD-ECF69EE760CB}" type="datetimeFigureOut">
               <a:rPr lang="en-US" smtClean="0"/>
               <a:pPr/>
-              <a:t>6/8/2014</a:t>
+              <a:t>6/9/2014</a:t>
             </a:fld>
             <a:endParaRPr lang="en-US"/>
           </a:p>
@@ -1869,7 +1870,7 @@
             <a:fld id="{904268BC-9134-45EB-BFAD-ECF69EE760CB}" type="datetimeFigureOut">
               <a:rPr lang="en-US" smtClean="0"/>
               <a:pPr/>
-              <a:t>6/8/2014</a:t>
+              <a:t>6/9/2014</a:t>
             </a:fld>
             <a:endParaRPr lang="en-US"/>
           </a:p>
@@ -1961,7 +1962,7 @@
             <a:fld id="{904268BC-9134-45EB-BFAD-ECF69EE760CB}" type="datetimeFigureOut">
               <a:rPr lang="en-US" smtClean="0"/>
               <a:pPr/>
-              <a:t>6/8/2014</a:t>
+              <a:t>6/9/2014</a:t>
             </a:fld>
             <a:endParaRPr lang="en-US"/>
           </a:p>
@@ -2235,7 +2236,7 @@
             <a:fld id="{904268BC-9134-45EB-BFAD-ECF69EE760CB}" type="datetimeFigureOut">
               <a:rPr lang="en-US" smtClean="0"/>
               <a:pPr/>
-              <a:t>6/8/2014</a:t>
+              <a:t>6/9/2014</a:t>
             </a:fld>
             <a:endParaRPr lang="en-US"/>
           </a:p>
@@ -2485,7 +2486,7 @@
             <a:fld id="{904268BC-9134-45EB-BFAD-ECF69EE760CB}" type="datetimeFigureOut">
               <a:rPr lang="en-US" smtClean="0"/>
               <a:pPr/>
-              <a:t>6/8/2014</a:t>
+              <a:t>6/9/2014</a:t>
             </a:fld>
             <a:endParaRPr lang="en-US"/>
           </a:p>
@@ -2695,7 +2696,7 @@
             <a:fld id="{904268BC-9134-45EB-BFAD-ECF69EE760CB}" type="datetimeFigureOut">
               <a:rPr lang="en-US" smtClean="0"/>
               <a:pPr/>
-              <a:t>6/8/2014</a:t>
+              <a:t>6/9/2014</a:t>
             </a:fld>
             <a:endParaRPr lang="en-US"/>
           </a:p>
@@ -3359,11 +3360,7 @@
           <a:p>
             <a:r>
               <a:rPr lang="en-US" dirty="0" smtClean="0"/>
-              <a:t>Library volunteers needed </a:t>
-            </a:r>
-            <a:r>
-              <a:rPr lang="en-US" dirty="0" smtClean="0"/>
-              <a:t>for</a:t>
+              <a:t>Library volunteers needed for</a:t>
             </a:r>
             <a:endParaRPr lang="en-US" dirty="0"/>
           </a:p>
@@ -3418,7 +3415,15 @@
             <a:pPr lvl="2"/>
             <a:r>
               <a:rPr lang="en-US" sz="3200" dirty="0" smtClean="0"/>
-              <a:t>Saturday   6 PM – 8 PM</a:t>
+              <a:t>Saturday </a:t>
+            </a:r>
+            <a:r>
+              <a:rPr lang="en-US" sz="3200" dirty="0" smtClean="0"/>
+              <a:t>,  </a:t>
+            </a:r>
+            <a:r>
+              <a:rPr lang="en-US" sz="3200" dirty="0" smtClean="0"/>
+              <a:t>6 PM – 8 PM</a:t>
             </a:r>
           </a:p>
           <a:p>
@@ -3977,6 +3982,154 @@
           </a:p>
         </p:txBody>
       </p:sp>
+    </p:spTree>
+  </p:cSld>
+  <p:clrMapOvr>
+    <a:masterClrMapping/>
+  </p:clrMapOvr>
+  <p:timing>
+    <p:tnLst>
+      <p:par>
+        <p:cTn id="1" dur="indefinite" restart="never" nodeType="tmRoot"/>
+      </p:par>
+    </p:tnLst>
+  </p:timing>
+</p:sld>
+</file>
+
+<file path=ppt/slides/slide9.xml><?xml version="1.0" encoding="utf-8"?>
+<p:sld xmlns:a="http://schemas.openxmlformats.org/drawingml/2006/main" xmlns:r="http://schemas.openxmlformats.org/officeDocument/2006/relationships" xmlns:p="http://schemas.openxmlformats.org/presentationml/2006/main">
+  <p:cSld>
+    <p:spTree>
+      <p:nvGrpSpPr>
+        <p:cNvPr id="1" name=""/>
+        <p:cNvGrpSpPr/>
+        <p:nvPr/>
+      </p:nvGrpSpPr>
+      <p:grpSpPr>
+        <a:xfrm>
+          <a:off x="0" y="0"/>
+          <a:ext cx="0" cy="0"/>
+          <a:chOff x="0" y="0"/>
+          <a:chExt cx="0" cy="0"/>
+        </a:xfrm>
+      </p:grpSpPr>
+      <p:sp>
+        <p:nvSpPr>
+          <p:cNvPr id="2" name="Title 1"/>
+          <p:cNvSpPr>
+            <a:spLocks noGrp="1"/>
+          </p:cNvSpPr>
+          <p:nvPr>
+            <p:ph type="title"/>
+          </p:nvPr>
+        </p:nvSpPr>
+        <p:spPr/>
+        <p:txBody>
+          <a:bodyPr/>
+          <a:lstStyle/>
+          <a:p>
+            <a:r>
+              <a:rPr lang="en-US" smtClean="0"/>
+              <a:t>In </a:t>
+            </a:r>
+            <a:r>
+              <a:rPr lang="en-US" dirty="0" err="1" smtClean="0"/>
+              <a:t>Langar</a:t>
+            </a:r>
+            <a:r>
+              <a:rPr lang="en-US" dirty="0" smtClean="0"/>
+              <a:t> Hall</a:t>
+            </a:r>
+            <a:endParaRPr lang="en-US" dirty="0"/>
+          </a:p>
+        </p:txBody>
+      </p:sp>
+      <p:sp>
+        <p:nvSpPr>
+          <p:cNvPr id="3" name="Content Placeholder 2"/>
+          <p:cNvSpPr>
+            <a:spLocks noGrp="1"/>
+          </p:cNvSpPr>
+          <p:nvPr>
+            <p:ph idx="1"/>
+          </p:nvPr>
+        </p:nvSpPr>
+        <p:spPr>
+          <a:xfrm>
+            <a:off x="4343400" y="1600200"/>
+            <a:ext cx="4343400" cy="4525963"/>
+          </a:xfrm>
+        </p:spPr>
+        <p:txBody>
+          <a:bodyPr/>
+          <a:lstStyle/>
+          <a:p>
+            <a:pPr algn="ctr">
+              <a:buNone/>
+            </a:pPr>
+            <a:r>
+              <a:rPr lang="en-US" sz="4400" dirty="0" smtClean="0"/>
+              <a:t>Please do not sit</a:t>
+            </a:r>
+          </a:p>
+          <a:p>
+            <a:pPr algn="ctr">
+              <a:buNone/>
+            </a:pPr>
+            <a:r>
+              <a:rPr lang="en-US" sz="4400" dirty="0" smtClean="0"/>
+              <a:t>in lines with</a:t>
+            </a:r>
+          </a:p>
+          <a:p>
+            <a:pPr algn="ctr">
+              <a:buNone/>
+            </a:pPr>
+            <a:r>
+              <a:rPr lang="en-US" sz="4400" dirty="0" smtClean="0"/>
+              <a:t>cleaning in progress </a:t>
+            </a:r>
+          </a:p>
+          <a:p>
+            <a:pPr algn="ctr">
+              <a:buNone/>
+            </a:pPr>
+            <a:r>
+              <a:rPr lang="en-US" sz="4400" dirty="0" smtClean="0"/>
+              <a:t>boards</a:t>
+            </a:r>
+          </a:p>
+          <a:p>
+            <a:endParaRPr lang="en-US" dirty="0"/>
+          </a:p>
+        </p:txBody>
+      </p:sp>
+      <p:pic>
+        <p:nvPicPr>
+          <p:cNvPr id="4" name="Picture 3" descr="20140608_204827.jpg"/>
+          <p:cNvPicPr>
+            <a:picLocks noChangeAspect="1"/>
+          </p:cNvPicPr>
+          <p:nvPr/>
+        </p:nvPicPr>
+        <p:blipFill>
+          <a:blip r:embed="rId2" cstate="print"/>
+          <a:srcRect l="15833" t="12963" r="10000" b="7037"/>
+          <a:stretch>
+            <a:fillRect/>
+          </a:stretch>
+        </p:blipFill>
+        <p:spPr>
+          <a:xfrm rot="5400000">
+            <a:off x="-151520" y="2509490"/>
+            <a:ext cx="5033432" cy="3053992"/>
+          </a:xfrm>
+          <a:prstGeom prst="rect">
+            <a:avLst/>
+          </a:prstGeom>
+        </p:spPr>
+      </p:pic>
     </p:spTree>
   </p:cSld>
   <p:clrMapOvr>

</xml_diff>

<commit_message>
Changing all background to navy blue.
</commit_message>
<xml_diff>
--- a/software/util/Standard_Templates.pptx
+++ b/software/util/Standard_Templates.pptx
@@ -297,7 +297,7 @@
             <a:fld id="{904268BC-9134-45EB-BFAD-ECF69EE760CB}" type="datetimeFigureOut">
               <a:rPr lang="en-US" smtClean="0"/>
               <a:pPr/>
-              <a:t>6/9/2014</a:t>
+              <a:t>7/3/2014</a:t>
             </a:fld>
             <a:endParaRPr lang="en-US"/>
           </a:p>
@@ -464,7 +464,7 @@
             <a:fld id="{904268BC-9134-45EB-BFAD-ECF69EE760CB}" type="datetimeFigureOut">
               <a:rPr lang="en-US" smtClean="0"/>
               <a:pPr/>
-              <a:t>6/9/2014</a:t>
+              <a:t>7/3/2014</a:t>
             </a:fld>
             <a:endParaRPr lang="en-US"/>
           </a:p>
@@ -641,7 +641,7 @@
             <a:fld id="{904268BC-9134-45EB-BFAD-ECF69EE760CB}" type="datetimeFigureOut">
               <a:rPr lang="en-US" smtClean="0"/>
               <a:pPr/>
-              <a:t>6/9/2014</a:t>
+              <a:t>7/3/2014</a:t>
             </a:fld>
             <a:endParaRPr lang="en-US"/>
           </a:p>
@@ -808,7 +808,7 @@
             <a:fld id="{904268BC-9134-45EB-BFAD-ECF69EE760CB}" type="datetimeFigureOut">
               <a:rPr lang="en-US" smtClean="0"/>
               <a:pPr/>
-              <a:t>6/9/2014</a:t>
+              <a:t>7/3/2014</a:t>
             </a:fld>
             <a:endParaRPr lang="en-US"/>
           </a:p>
@@ -1051,7 +1051,7 @@
             <a:fld id="{904268BC-9134-45EB-BFAD-ECF69EE760CB}" type="datetimeFigureOut">
               <a:rPr lang="en-US" smtClean="0"/>
               <a:pPr/>
-              <a:t>6/9/2014</a:t>
+              <a:t>7/3/2014</a:t>
             </a:fld>
             <a:endParaRPr lang="en-US"/>
           </a:p>
@@ -1336,7 +1336,7 @@
             <a:fld id="{904268BC-9134-45EB-BFAD-ECF69EE760CB}" type="datetimeFigureOut">
               <a:rPr lang="en-US" smtClean="0"/>
               <a:pPr/>
-              <a:t>6/9/2014</a:t>
+              <a:t>7/3/2014</a:t>
             </a:fld>
             <a:endParaRPr lang="en-US"/>
           </a:p>
@@ -1755,7 +1755,7 @@
             <a:fld id="{904268BC-9134-45EB-BFAD-ECF69EE760CB}" type="datetimeFigureOut">
               <a:rPr lang="en-US" smtClean="0"/>
               <a:pPr/>
-              <a:t>6/9/2014</a:t>
+              <a:t>7/3/2014</a:t>
             </a:fld>
             <a:endParaRPr lang="en-US"/>
           </a:p>
@@ -1870,7 +1870,7 @@
             <a:fld id="{904268BC-9134-45EB-BFAD-ECF69EE760CB}" type="datetimeFigureOut">
               <a:rPr lang="en-US" smtClean="0"/>
               <a:pPr/>
-              <a:t>6/9/2014</a:t>
+              <a:t>7/3/2014</a:t>
             </a:fld>
             <a:endParaRPr lang="en-US"/>
           </a:p>
@@ -1962,7 +1962,7 @@
             <a:fld id="{904268BC-9134-45EB-BFAD-ECF69EE760CB}" type="datetimeFigureOut">
               <a:rPr lang="en-US" smtClean="0"/>
               <a:pPr/>
-              <a:t>6/9/2014</a:t>
+              <a:t>7/3/2014</a:t>
             </a:fld>
             <a:endParaRPr lang="en-US"/>
           </a:p>
@@ -2236,7 +2236,7 @@
             <a:fld id="{904268BC-9134-45EB-BFAD-ECF69EE760CB}" type="datetimeFigureOut">
               <a:rPr lang="en-US" smtClean="0"/>
               <a:pPr/>
-              <a:t>6/9/2014</a:t>
+              <a:t>7/3/2014</a:t>
             </a:fld>
             <a:endParaRPr lang="en-US"/>
           </a:p>
@@ -2486,7 +2486,7 @@
             <a:fld id="{904268BC-9134-45EB-BFAD-ECF69EE760CB}" type="datetimeFigureOut">
               <a:rPr lang="en-US" smtClean="0"/>
               <a:pPr/>
-              <a:t>6/9/2014</a:t>
+              <a:t>7/3/2014</a:t>
             </a:fld>
             <a:endParaRPr lang="en-US"/>
           </a:p>
@@ -2547,9 +2547,12 @@
 <p:sldMaster xmlns:a="http://schemas.openxmlformats.org/drawingml/2006/main" xmlns:r="http://schemas.openxmlformats.org/officeDocument/2006/relationships" xmlns:p="http://schemas.openxmlformats.org/presentationml/2006/main">
   <p:cSld>
     <p:bg>
-      <p:bgRef idx="1001">
-        <a:schemeClr val="bg1"/>
-      </p:bgRef>
+      <p:bgPr>
+        <a:solidFill>
+          <a:srgbClr val="002060"/>
+        </a:solidFill>
+        <a:effectLst/>
+      </p:bgPr>
     </p:bg>
     <p:spTree>
       <p:nvGrpSpPr>
@@ -2696,7 +2699,7 @@
             <a:fld id="{904268BC-9134-45EB-BFAD-ECF69EE760CB}" type="datetimeFigureOut">
               <a:rPr lang="en-US" smtClean="0"/>
               <a:pPr/>
-              <a:t>6/9/2014</a:t>
+              <a:t>7/3/2014</a:t>
             </a:fld>
             <a:endParaRPr lang="en-US"/>
           </a:p>
@@ -3107,11 +3110,19 @@
               <a:buNone/>
             </a:pPr>
             <a:r>
-              <a:rPr lang="en-US" sz="5400" dirty="0" err="1" smtClean="0"/>
+              <a:rPr lang="en-US" sz="5400" dirty="0" err="1" smtClean="0">
+                <a:solidFill>
+                  <a:schemeClr val="bg1"/>
+                </a:solidFill>
+              </a:rPr>
               <a:t>Hukamnama</a:t>
             </a:r>
             <a:r>
-              <a:rPr lang="en-US" sz="5400" dirty="0" smtClean="0"/>
+              <a:rPr lang="en-US" sz="5400" dirty="0" smtClean="0">
+                <a:solidFill>
+                  <a:schemeClr val="bg1"/>
+                </a:solidFill>
+              </a:rPr>
               <a:t> in progress.</a:t>
             </a:r>
           </a:p>
@@ -3120,7 +3131,11 @@
               <a:buNone/>
             </a:pPr>
             <a:r>
-              <a:rPr lang="en-US" sz="5400" dirty="0" smtClean="0"/>
+              <a:rPr lang="en-US" sz="5400" dirty="0" smtClean="0">
+                <a:solidFill>
+                  <a:schemeClr val="bg1"/>
+                </a:solidFill>
+              </a:rPr>
               <a:t>Kindly sit and listen</a:t>
             </a:r>
           </a:p>
@@ -3129,7 +3144,11 @@
               <a:buNone/>
             </a:pPr>
             <a:r>
-              <a:rPr lang="en-US" sz="5400" dirty="0" smtClean="0"/>
+              <a:rPr lang="en-US" sz="5400" dirty="0" smtClean="0">
+                <a:solidFill>
+                  <a:schemeClr val="bg1"/>
+                </a:solidFill>
+              </a:rPr>
               <a:t>Please don’t speak</a:t>
             </a:r>
           </a:p>
@@ -3138,7 +3157,11 @@
               <a:buNone/>
             </a:pPr>
             <a:r>
-              <a:rPr lang="en-US" sz="5400" dirty="0" smtClean="0"/>
+              <a:rPr lang="en-US" sz="5400" dirty="0" smtClean="0">
+                <a:solidFill>
+                  <a:schemeClr val="bg1"/>
+                </a:solidFill>
+              </a:rPr>
               <a:t> </a:t>
             </a:r>
           </a:p>
@@ -3147,9 +3170,26 @@
               <a:buNone/>
             </a:pPr>
             <a:r>
-              <a:rPr lang="en-US" dirty="0" smtClean="0"/>
-              <a:t>Translation to follow .</a:t>
-            </a:r>
+              <a:rPr lang="en-US" dirty="0" smtClean="0">
+                <a:solidFill>
+                  <a:schemeClr val="bg1"/>
+                </a:solidFill>
+              </a:rPr>
+              <a:t>Translation to </a:t>
+            </a:r>
+            <a:r>
+              <a:rPr lang="en-US" dirty="0" smtClean="0">
+                <a:solidFill>
+                  <a:schemeClr val="bg1"/>
+                </a:solidFill>
+              </a:rPr>
+              <a:t>follow…</a:t>
+            </a:r>
+            <a:endParaRPr lang="en-US" dirty="0" smtClean="0">
+              <a:solidFill>
+                <a:schemeClr val="bg1"/>
+              </a:solidFill>
+            </a:endParaRPr>
           </a:p>
         </p:txBody>
       </p:sp>
@@ -3204,18 +3244,34 @@
           <a:p>
             <a:pPr algn="l"/>
             <a:r>
-              <a:rPr lang="en-US" dirty="0" smtClean="0"/>
+              <a:rPr lang="en-US" dirty="0" smtClean="0">
+                <a:solidFill>
+                  <a:schemeClr val="bg1"/>
+                </a:solidFill>
+              </a:rPr>
               <a:t>Please spare 15-30  min. to do </a:t>
             </a:r>
             <a:r>
-              <a:rPr lang="en-US" dirty="0" err="1" smtClean="0"/>
+              <a:rPr lang="en-US" dirty="0" err="1" smtClean="0">
+                <a:solidFill>
+                  <a:schemeClr val="bg1"/>
+                </a:solidFill>
+              </a:rPr>
               <a:t>sewa</a:t>
             </a:r>
             <a:r>
-              <a:rPr lang="en-US" dirty="0" smtClean="0"/>
+              <a:rPr lang="en-US" dirty="0" smtClean="0">
+                <a:solidFill>
+                  <a:schemeClr val="bg1"/>
+                </a:solidFill>
+              </a:rPr>
               <a:t> (volunteer) for</a:t>
             </a:r>
-            <a:endParaRPr lang="en-US" dirty="0"/>
+            <a:endParaRPr lang="en-US" dirty="0">
+              <a:solidFill>
+                <a:schemeClr val="bg1"/>
+              </a:solidFill>
+            </a:endParaRPr>
           </a:p>
         </p:txBody>
       </p:sp>
@@ -3242,18 +3298,34 @@
           <a:lstStyle/>
           <a:p>
             <a:r>
-              <a:rPr lang="en-US" sz="5400" dirty="0" smtClean="0"/>
+              <a:rPr lang="en-US" sz="5400" dirty="0" smtClean="0">
+                <a:solidFill>
+                  <a:schemeClr val="bg1"/>
+                </a:solidFill>
+              </a:rPr>
               <a:t>Serving </a:t>
             </a:r>
             <a:r>
-              <a:rPr lang="en-US" sz="5400" dirty="0" err="1" smtClean="0"/>
+              <a:rPr lang="en-US" sz="5400" dirty="0" err="1" smtClean="0">
+                <a:solidFill>
+                  <a:schemeClr val="bg1"/>
+                </a:solidFill>
+              </a:rPr>
               <a:t>Langar</a:t>
             </a:r>
-            <a:endParaRPr lang="en-US" sz="5400" dirty="0" smtClean="0"/>
-          </a:p>
-          <a:p>
-            <a:r>
-              <a:rPr lang="en-US" sz="5400" dirty="0" smtClean="0"/>
+            <a:endParaRPr lang="en-US" sz="5400" dirty="0" smtClean="0">
+              <a:solidFill>
+                <a:schemeClr val="bg1"/>
+              </a:solidFill>
+            </a:endParaRPr>
+          </a:p>
+          <a:p>
+            <a:r>
+              <a:rPr lang="en-US" sz="5400" dirty="0" smtClean="0">
+                <a:solidFill>
+                  <a:schemeClr val="bg1"/>
+                </a:solidFill>
+              </a:rPr>
               <a:t>Cleaning </a:t>
             </a:r>
           </a:p>
@@ -3263,7 +3335,11 @@
               <a:buChar char="v"/>
             </a:pPr>
             <a:r>
-              <a:rPr lang="en-US" sz="4200" dirty="0" smtClean="0"/>
+              <a:rPr lang="en-US" sz="4200" dirty="0" smtClean="0">
+                <a:solidFill>
+                  <a:schemeClr val="bg1"/>
+                </a:solidFill>
+              </a:rPr>
               <a:t>  Kitchen</a:t>
             </a:r>
           </a:p>
@@ -3273,7 +3349,11 @@
               <a:buChar char="v"/>
             </a:pPr>
             <a:r>
-              <a:rPr lang="en-US" sz="4200" dirty="0" smtClean="0"/>
+              <a:rPr lang="en-US" sz="4200" dirty="0" smtClean="0">
+                <a:solidFill>
+                  <a:schemeClr val="bg1"/>
+                </a:solidFill>
+              </a:rPr>
               <a:t>  Utensils</a:t>
             </a:r>
           </a:p>
@@ -3283,11 +3363,19 @@
               <a:buChar char="v"/>
             </a:pPr>
             <a:r>
-              <a:rPr lang="en-US" sz="4200" dirty="0" smtClean="0"/>
+              <a:rPr lang="en-US" sz="4200" dirty="0" smtClean="0">
+                <a:solidFill>
+                  <a:schemeClr val="bg1"/>
+                </a:solidFill>
+              </a:rPr>
               <a:t>  M</a:t>
             </a:r>
             <a:r>
-              <a:rPr lang="en-US" sz="4600" dirty="0" smtClean="0"/>
+              <a:rPr lang="en-US" sz="4600" dirty="0" smtClean="0">
+                <a:solidFill>
+                  <a:schemeClr val="bg1"/>
+                </a:solidFill>
+              </a:rPr>
               <a:t>ats</a:t>
             </a:r>
           </a:p>
@@ -3297,7 +3385,11 @@
               <a:buChar char="v"/>
             </a:pPr>
             <a:r>
-              <a:rPr lang="en-US" sz="4600" dirty="0" smtClean="0"/>
+              <a:rPr lang="en-US" sz="4600" dirty="0" smtClean="0">
+                <a:solidFill>
+                  <a:schemeClr val="bg1"/>
+                </a:solidFill>
+              </a:rPr>
               <a:t>  Floor</a:t>
             </a:r>
           </a:p>
@@ -3305,7 +3397,11 @@
             <a:pPr>
               <a:buNone/>
             </a:pPr>
-            <a:endParaRPr lang="en-US" sz="5400" dirty="0" smtClean="0"/>
+            <a:endParaRPr lang="en-US" sz="5400" dirty="0" smtClean="0">
+              <a:solidFill>
+                <a:schemeClr val="bg1"/>
+              </a:solidFill>
+            </a:endParaRPr>
           </a:p>
         </p:txBody>
       </p:sp>
@@ -3359,10 +3455,18 @@
           <a:lstStyle/>
           <a:p>
             <a:r>
-              <a:rPr lang="en-US" dirty="0" smtClean="0"/>
+              <a:rPr lang="en-US" dirty="0" smtClean="0">
+                <a:solidFill>
+                  <a:schemeClr val="bg1"/>
+                </a:solidFill>
+              </a:rPr>
               <a:t>Library volunteers needed for</a:t>
             </a:r>
-            <a:endParaRPr lang="en-US" dirty="0"/>
+            <a:endParaRPr lang="en-US" dirty="0">
+              <a:solidFill>
+                <a:schemeClr val="bg1"/>
+              </a:solidFill>
+            </a:endParaRPr>
           </a:p>
         </p:txBody>
       </p:sp>
@@ -3388,7 +3492,11 @@
               <a:buChar char="v"/>
             </a:pPr>
             <a:r>
-              <a:rPr lang="en-US" sz="3600" dirty="0" smtClean="0"/>
+              <a:rPr lang="en-US" sz="3600" dirty="0" smtClean="0">
+                <a:solidFill>
+                  <a:schemeClr val="bg1"/>
+                </a:solidFill>
+              </a:rPr>
               <a:t>  Book issuing</a:t>
             </a:r>
           </a:p>
@@ -3398,48 +3506,68 @@
               <a:buChar char="v"/>
             </a:pPr>
             <a:r>
-              <a:rPr lang="en-US" sz="3600" dirty="0" smtClean="0"/>
+              <a:rPr lang="en-US" sz="3600" dirty="0" smtClean="0">
+                <a:solidFill>
+                  <a:schemeClr val="bg1"/>
+                </a:solidFill>
+              </a:rPr>
               <a:t>  Registering new members </a:t>
             </a:r>
           </a:p>
           <a:p>
-            <a:endParaRPr lang="en-US" dirty="0" smtClean="0"/>
-          </a:p>
-          <a:p>
-            <a:r>
-              <a:rPr lang="en-US" dirty="0" smtClean="0"/>
+            <a:endParaRPr lang="en-US" dirty="0" smtClean="0">
+              <a:solidFill>
+                <a:schemeClr val="bg1"/>
+              </a:solidFill>
+            </a:endParaRPr>
+          </a:p>
+          <a:p>
+            <a:r>
+              <a:rPr lang="en-US" dirty="0" smtClean="0">
+                <a:solidFill>
+                  <a:schemeClr val="bg1"/>
+                </a:solidFill>
+              </a:rPr>
               <a:t>Opening hours</a:t>
             </a:r>
           </a:p>
           <a:p>
             <a:pPr lvl="2"/>
             <a:r>
-              <a:rPr lang="en-US" sz="3200" dirty="0" smtClean="0"/>
-              <a:t>Saturday </a:t>
-            </a:r>
-            <a:r>
-              <a:rPr lang="en-US" sz="3200" dirty="0" smtClean="0"/>
-              <a:t>,  </a:t>
-            </a:r>
-            <a:r>
-              <a:rPr lang="en-US" sz="3200" dirty="0" smtClean="0"/>
-              <a:t>6 PM – 8 PM</a:t>
+              <a:rPr lang="en-US" sz="3200" dirty="0" smtClean="0">
+                <a:solidFill>
+                  <a:schemeClr val="bg1"/>
+                </a:solidFill>
+              </a:rPr>
+              <a:t>Saturday ,  6 PM – 8 PM</a:t>
             </a:r>
           </a:p>
           <a:p>
             <a:pPr lvl="2"/>
             <a:r>
-              <a:rPr lang="en-US" sz="3200" dirty="0" smtClean="0"/>
+              <a:rPr lang="en-US" sz="3200" dirty="0" smtClean="0">
+                <a:solidFill>
+                  <a:schemeClr val="bg1"/>
+                </a:solidFill>
+              </a:rPr>
               <a:t>Sunday    ,  10  AM – 1 PM</a:t>
             </a:r>
           </a:p>
           <a:p>
             <a:pPr lvl="2"/>
             <a:r>
-              <a:rPr lang="en-US" sz="3200" dirty="0" smtClean="0"/>
+              <a:rPr lang="en-US" sz="3200" dirty="0" smtClean="0">
+                <a:solidFill>
+                  <a:schemeClr val="bg1"/>
+                </a:solidFill>
+              </a:rPr>
               <a:t>Weekdays  , Evening  6 – 7 PM</a:t>
             </a:r>
-            <a:endParaRPr lang="en-US" sz="3200" dirty="0"/>
+            <a:endParaRPr lang="en-US" sz="3200" dirty="0">
+              <a:solidFill>
+                <a:schemeClr val="bg1"/>
+              </a:solidFill>
+            </a:endParaRPr>
           </a:p>
         </p:txBody>
       </p:sp>
@@ -3515,11 +3643,19 @@
               <a:buNone/>
             </a:pPr>
             <a:r>
-              <a:rPr lang="en-US" sz="5400" dirty="0" err="1" smtClean="0"/>
+              <a:rPr lang="en-US" sz="5400" dirty="0" err="1" smtClean="0">
+                <a:solidFill>
+                  <a:schemeClr val="bg1"/>
+                </a:solidFill>
+              </a:rPr>
               <a:t>Ardaas</a:t>
             </a:r>
             <a:r>
-              <a:rPr lang="en-US" sz="5400" dirty="0" smtClean="0"/>
+              <a:rPr lang="en-US" sz="5400" dirty="0" smtClean="0">
+                <a:solidFill>
+                  <a:schemeClr val="bg1"/>
+                </a:solidFill>
+              </a:rPr>
               <a:t> in progress.</a:t>
             </a:r>
           </a:p>
@@ -3528,7 +3664,11 @@
               <a:buNone/>
             </a:pPr>
             <a:r>
-              <a:rPr lang="en-US" sz="5400" dirty="0" smtClean="0"/>
+              <a:rPr lang="en-US" sz="5400" dirty="0" smtClean="0">
+                <a:solidFill>
+                  <a:schemeClr val="bg1"/>
+                </a:solidFill>
+              </a:rPr>
               <a:t>Kindly stand and listen</a:t>
             </a:r>
           </a:p>
@@ -3537,7 +3677,11 @@
               <a:buNone/>
             </a:pPr>
             <a:r>
-              <a:rPr lang="en-US" sz="5400" dirty="0" smtClean="0"/>
+              <a:rPr lang="en-US" sz="5400" dirty="0" smtClean="0">
+                <a:solidFill>
+                  <a:schemeClr val="bg1"/>
+                </a:solidFill>
+              </a:rPr>
               <a:t>Please don’t speak </a:t>
             </a:r>
           </a:p>
@@ -3545,18 +3689,30 @@
             <a:pPr algn="ctr">
               <a:buNone/>
             </a:pPr>
-            <a:endParaRPr lang="en-US" sz="5400" dirty="0" smtClean="0"/>
+            <a:endParaRPr lang="en-US" sz="5400" dirty="0" smtClean="0">
+              <a:solidFill>
+                <a:schemeClr val="bg1"/>
+              </a:solidFill>
+            </a:endParaRPr>
           </a:p>
           <a:p>
             <a:pPr algn="r">
               <a:buNone/>
             </a:pPr>
             <a:r>
-              <a:rPr lang="en-US" sz="2800" dirty="0" err="1" smtClean="0"/>
+              <a:rPr lang="en-US" sz="2800" dirty="0" err="1" smtClean="0">
+                <a:solidFill>
+                  <a:schemeClr val="bg1"/>
+                </a:solidFill>
+              </a:rPr>
               <a:t>Ardaas</a:t>
             </a:r>
             <a:r>
-              <a:rPr lang="en-US" sz="2800" dirty="0" smtClean="0"/>
+              <a:rPr lang="en-US" sz="2800" dirty="0" smtClean="0">
+                <a:solidFill>
+                  <a:schemeClr val="bg1"/>
+                </a:solidFill>
+              </a:rPr>
               <a:t>  means Prayer</a:t>
             </a:r>
           </a:p>
@@ -3564,7 +3720,11 @@
             <a:pPr algn="ctr">
               <a:buNone/>
             </a:pPr>
-            <a:endParaRPr lang="en-US" sz="5400" dirty="0" smtClean="0"/>
+            <a:endParaRPr lang="en-US" sz="5400" dirty="0" smtClean="0">
+              <a:solidFill>
+                <a:schemeClr val="bg1"/>
+              </a:solidFill>
+            </a:endParaRPr>
           </a:p>
         </p:txBody>
       </p:sp>
@@ -3640,7 +3800,11 @@
               <a:buNone/>
             </a:pPr>
             <a:r>
-              <a:rPr lang="en-US" sz="5400" dirty="0" smtClean="0"/>
+              <a:rPr lang="en-US" sz="5400" dirty="0" smtClean="0">
+                <a:solidFill>
+                  <a:schemeClr val="bg1"/>
+                </a:solidFill>
+              </a:rPr>
               <a:t>Headlights of Car number </a:t>
             </a:r>
           </a:p>
@@ -3648,14 +3812,22 @@
             <a:pPr algn="ctr">
               <a:buNone/>
             </a:pPr>
-            <a:endParaRPr lang="en-US" sz="5400" dirty="0" smtClean="0"/>
+            <a:endParaRPr lang="en-US" sz="5400" dirty="0" smtClean="0">
+              <a:solidFill>
+                <a:schemeClr val="bg1"/>
+              </a:solidFill>
+            </a:endParaRPr>
           </a:p>
           <a:p>
             <a:pPr algn="ctr">
               <a:buNone/>
             </a:pPr>
             <a:r>
-              <a:rPr lang="en-US" sz="5400" dirty="0" smtClean="0"/>
+              <a:rPr lang="en-US" sz="5400" dirty="0" smtClean="0">
+                <a:solidFill>
+                  <a:schemeClr val="bg1"/>
+                </a:solidFill>
+              </a:rPr>
               <a:t>are ON</a:t>
             </a:r>
           </a:p>
@@ -3664,7 +3836,11 @@
               <a:buNone/>
             </a:pPr>
             <a:r>
-              <a:rPr lang="en-US" sz="5400" dirty="0" smtClean="0"/>
+              <a:rPr lang="en-US" sz="5400" dirty="0" smtClean="0">
+                <a:solidFill>
+                  <a:schemeClr val="bg1"/>
+                </a:solidFill>
+              </a:rPr>
               <a:t>Please turn them OFF</a:t>
             </a:r>
           </a:p>
@@ -3672,13 +3848,21 @@
             <a:pPr algn="ctr">
               <a:buNone/>
             </a:pPr>
-            <a:endParaRPr lang="en-US" sz="5400" dirty="0" smtClean="0"/>
+            <a:endParaRPr lang="en-US" sz="5400" dirty="0" smtClean="0">
+              <a:solidFill>
+                <a:schemeClr val="bg1"/>
+              </a:solidFill>
+            </a:endParaRPr>
           </a:p>
           <a:p>
             <a:pPr algn="ctr">
               <a:buNone/>
             </a:pPr>
-            <a:endParaRPr lang="en-US" sz="5400" dirty="0" smtClean="0"/>
+            <a:endParaRPr lang="en-US" sz="5400" dirty="0" smtClean="0">
+              <a:solidFill>
+                <a:schemeClr val="bg1"/>
+              </a:solidFill>
+            </a:endParaRPr>
           </a:p>
         </p:txBody>
       </p:sp>
@@ -3754,7 +3938,11 @@
               <a:buNone/>
             </a:pPr>
             <a:r>
-              <a:rPr lang="en-US" sz="5400" dirty="0" smtClean="0"/>
+              <a:rPr lang="en-US" sz="5400" dirty="0" smtClean="0">
+                <a:solidFill>
+                  <a:schemeClr val="bg1"/>
+                </a:solidFill>
+              </a:rPr>
               <a:t>Child named </a:t>
             </a:r>
           </a:p>
@@ -3762,17 +3950,29 @@
             <a:pPr algn="ctr">
               <a:buNone/>
             </a:pPr>
-            <a:endParaRPr lang="en-US" sz="5400" dirty="0" smtClean="0"/>
+            <a:endParaRPr lang="en-US" sz="5400" dirty="0" smtClean="0">
+              <a:solidFill>
+                <a:schemeClr val="bg1"/>
+              </a:solidFill>
+            </a:endParaRPr>
           </a:p>
           <a:p>
             <a:pPr algn="ctr">
               <a:buNone/>
             </a:pPr>
             <a:r>
-              <a:rPr lang="en-US" sz="5400" dirty="0" smtClean="0"/>
+              <a:rPr lang="en-US" sz="5400" dirty="0" smtClean="0">
+                <a:solidFill>
+                  <a:schemeClr val="bg1"/>
+                </a:solidFill>
+              </a:rPr>
               <a:t>has separated from Parents. Please come near stage</a:t>
             </a:r>
-            <a:endParaRPr lang="en-US" sz="5400" dirty="0"/>
+            <a:endParaRPr lang="en-US" sz="5400" dirty="0">
+              <a:solidFill>
+                <a:schemeClr val="bg1"/>
+              </a:solidFill>
+            </a:endParaRPr>
           </a:p>
         </p:txBody>
       </p:sp>
@@ -3848,7 +4048,11 @@
               <a:buNone/>
             </a:pPr>
             <a:r>
-              <a:rPr lang="en-US" sz="5400" dirty="0" smtClean="0"/>
+              <a:rPr lang="en-US" sz="5400" dirty="0" smtClean="0">
+                <a:solidFill>
+                  <a:schemeClr val="bg1"/>
+                </a:solidFill>
+              </a:rPr>
               <a:t>Mobile &lt;&gt;</a:t>
             </a:r>
           </a:p>
@@ -3856,14 +4060,22 @@
             <a:pPr algn="ctr">
               <a:buNone/>
             </a:pPr>
-            <a:endParaRPr lang="en-US" sz="5400" dirty="0" smtClean="0"/>
+            <a:endParaRPr lang="en-US" sz="5400" dirty="0" smtClean="0">
+              <a:solidFill>
+                <a:schemeClr val="bg1"/>
+              </a:solidFill>
+            </a:endParaRPr>
           </a:p>
           <a:p>
             <a:pPr algn="ctr">
               <a:buNone/>
             </a:pPr>
             <a:r>
-              <a:rPr lang="en-US" sz="5400" dirty="0" smtClean="0"/>
+              <a:rPr lang="en-US" sz="5400" dirty="0" smtClean="0">
+                <a:solidFill>
+                  <a:schemeClr val="bg1"/>
+                </a:solidFill>
+              </a:rPr>
               <a:t>has been found/lost</a:t>
             </a:r>
           </a:p>
@@ -3872,10 +4084,18 @@
               <a:buNone/>
             </a:pPr>
             <a:r>
-              <a:rPr lang="en-US" sz="5400" dirty="0" smtClean="0"/>
+              <a:rPr lang="en-US" sz="5400" dirty="0" smtClean="0">
+                <a:solidFill>
+                  <a:schemeClr val="bg1"/>
+                </a:solidFill>
+              </a:rPr>
               <a:t>Please come near stage</a:t>
             </a:r>
-            <a:endParaRPr lang="en-US" sz="5400" dirty="0"/>
+            <a:endParaRPr lang="en-US" sz="5400" dirty="0">
+              <a:solidFill>
+                <a:schemeClr val="bg1"/>
+              </a:solidFill>
+            </a:endParaRPr>
           </a:p>
         </p:txBody>
       </p:sp>
@@ -3951,7 +4171,11 @@
               <a:buNone/>
             </a:pPr>
             <a:r>
-              <a:rPr lang="en-US" sz="5400" dirty="0" smtClean="0"/>
+              <a:rPr lang="en-US" sz="5400" dirty="0" smtClean="0">
+                <a:solidFill>
+                  <a:schemeClr val="bg1"/>
+                </a:solidFill>
+              </a:rPr>
               <a:t>Keys&lt;&gt;</a:t>
             </a:r>
           </a:p>
@@ -3959,14 +4183,22 @@
             <a:pPr algn="ctr">
               <a:buNone/>
             </a:pPr>
-            <a:endParaRPr lang="en-US" sz="5400" dirty="0" smtClean="0"/>
+            <a:endParaRPr lang="en-US" sz="5400" dirty="0" smtClean="0">
+              <a:solidFill>
+                <a:schemeClr val="bg1"/>
+              </a:solidFill>
+            </a:endParaRPr>
           </a:p>
           <a:p>
             <a:pPr algn="ctr">
               <a:buNone/>
             </a:pPr>
             <a:r>
-              <a:rPr lang="en-US" sz="5400" dirty="0" smtClean="0"/>
+              <a:rPr lang="en-US" sz="5400" dirty="0" smtClean="0">
+                <a:solidFill>
+                  <a:schemeClr val="bg1"/>
+                </a:solidFill>
+              </a:rPr>
               <a:t>has been found/lost</a:t>
             </a:r>
           </a:p>
@@ -3975,10 +4207,18 @@
               <a:buNone/>
             </a:pPr>
             <a:r>
-              <a:rPr lang="en-US" sz="5400" dirty="0" smtClean="0"/>
+              <a:rPr lang="en-US" sz="5400" dirty="0" smtClean="0">
+                <a:solidFill>
+                  <a:schemeClr val="bg1"/>
+                </a:solidFill>
+              </a:rPr>
               <a:t>Please come near stage</a:t>
             </a:r>
-            <a:endParaRPr lang="en-US" sz="5400" dirty="0"/>
+            <a:endParaRPr lang="en-US" sz="5400" dirty="0">
+              <a:solidFill>
+                <a:schemeClr val="bg1"/>
+              </a:solidFill>
+            </a:endParaRPr>
           </a:p>
         </p:txBody>
       </p:sp>
@@ -4030,18 +4270,34 @@
           <a:lstStyle/>
           <a:p>
             <a:r>
-              <a:rPr lang="en-US" smtClean="0"/>
+              <a:rPr lang="en-US" dirty="0" smtClean="0">
+                <a:solidFill>
+                  <a:schemeClr val="bg1"/>
+                </a:solidFill>
+              </a:rPr>
               <a:t>In </a:t>
             </a:r>
             <a:r>
-              <a:rPr lang="en-US" dirty="0" err="1" smtClean="0"/>
+              <a:rPr lang="en-US" dirty="0" err="1" smtClean="0">
+                <a:solidFill>
+                  <a:schemeClr val="bg1"/>
+                </a:solidFill>
+              </a:rPr>
               <a:t>Langar</a:t>
             </a:r>
             <a:r>
-              <a:rPr lang="en-US" dirty="0" smtClean="0"/>
+              <a:rPr lang="en-US" smtClean="0">
+                <a:solidFill>
+                  <a:schemeClr val="bg1"/>
+                </a:solidFill>
+              </a:rPr>
               <a:t> Hall</a:t>
             </a:r>
-            <a:endParaRPr lang="en-US" dirty="0"/>
+            <a:endParaRPr lang="en-US" dirty="0">
+              <a:solidFill>
+                <a:schemeClr val="bg1"/>
+              </a:solidFill>
+            </a:endParaRPr>
           </a:p>
         </p:txBody>
       </p:sp>
@@ -4069,7 +4325,11 @@
               <a:buNone/>
             </a:pPr>
             <a:r>
-              <a:rPr lang="en-US" sz="4400" dirty="0" smtClean="0"/>
+              <a:rPr lang="en-US" sz="4400" dirty="0" smtClean="0">
+                <a:solidFill>
+                  <a:schemeClr val="bg1"/>
+                </a:solidFill>
+              </a:rPr>
               <a:t>Please do not sit</a:t>
             </a:r>
           </a:p>
@@ -4078,7 +4338,11 @@
               <a:buNone/>
             </a:pPr>
             <a:r>
-              <a:rPr lang="en-US" sz="4400" dirty="0" smtClean="0"/>
+              <a:rPr lang="en-US" sz="4400" dirty="0" smtClean="0">
+                <a:solidFill>
+                  <a:schemeClr val="bg1"/>
+                </a:solidFill>
+              </a:rPr>
               <a:t>in lines with</a:t>
             </a:r>
           </a:p>
@@ -4087,7 +4351,11 @@
               <a:buNone/>
             </a:pPr>
             <a:r>
-              <a:rPr lang="en-US" sz="4400" dirty="0" smtClean="0"/>
+              <a:rPr lang="en-US" sz="4400" dirty="0" smtClean="0">
+                <a:solidFill>
+                  <a:schemeClr val="bg1"/>
+                </a:solidFill>
+              </a:rPr>
               <a:t>cleaning in progress </a:t>
             </a:r>
           </a:p>
@@ -4096,12 +4364,20 @@
               <a:buNone/>
             </a:pPr>
             <a:r>
-              <a:rPr lang="en-US" sz="4400" dirty="0" smtClean="0"/>
+              <a:rPr lang="en-US" sz="4400" dirty="0" smtClean="0">
+                <a:solidFill>
+                  <a:schemeClr val="bg1"/>
+                </a:solidFill>
+              </a:rPr>
               <a:t>boards</a:t>
             </a:r>
           </a:p>
           <a:p>
-            <a:endParaRPr lang="en-US" dirty="0"/>
+            <a:endParaRPr lang="en-US" dirty="0">
+              <a:solidFill>
+                <a:schemeClr val="bg1"/>
+              </a:solidFill>
+            </a:endParaRPr>
           </a:p>
         </p:txBody>
       </p:sp>
@@ -4122,8 +4398,8 @@
         </p:blipFill>
         <p:spPr>
           <a:xfrm rot="5400000">
-            <a:off x="-151520" y="2509490"/>
-            <a:ext cx="5033432" cy="3053992"/>
+            <a:off x="554741" y="2336629"/>
+            <a:ext cx="4154310" cy="2520592"/>
           </a:xfrm>
           <a:prstGeom prst="rect">
             <a:avLst/>

</xml_diff>